<commit_message>
Added some user analysis plots
</commit_message>
<xml_diff>
--- a/EDA TELECOM DATA Final report.pptx
+++ b/EDA TELECOM DATA Final report.pptx
@@ -5,7 +5,7 @@
     <p:sldMasterId id="2147483823" r:id="rId1"/>
   </p:sldMasterIdLst>
   <p:notesMasterIdLst>
-    <p:notesMasterId r:id="rId32"/>
+    <p:notesMasterId r:id="rId24"/>
   </p:notesMasterIdLst>
   <p:sldIdLst>
     <p:sldId id="256" r:id="rId2"/>
@@ -20,24 +20,16 @@
     <p:sldId id="268" r:id="rId11"/>
     <p:sldId id="269" r:id="rId12"/>
     <p:sldId id="270" r:id="rId13"/>
-    <p:sldId id="271" r:id="rId14"/>
-    <p:sldId id="277" r:id="rId15"/>
-    <p:sldId id="278" r:id="rId16"/>
-    <p:sldId id="279" r:id="rId17"/>
-    <p:sldId id="280" r:id="rId18"/>
-    <p:sldId id="281" r:id="rId19"/>
+    <p:sldId id="281" r:id="rId14"/>
+    <p:sldId id="271" r:id="rId15"/>
+    <p:sldId id="277" r:id="rId16"/>
+    <p:sldId id="278" r:id="rId17"/>
+    <p:sldId id="279" r:id="rId18"/>
+    <p:sldId id="280" r:id="rId19"/>
     <p:sldId id="282" r:id="rId20"/>
-    <p:sldId id="283" r:id="rId21"/>
-    <p:sldId id="284" r:id="rId22"/>
-    <p:sldId id="285" r:id="rId23"/>
-    <p:sldId id="286" r:id="rId24"/>
-    <p:sldId id="287" r:id="rId25"/>
-    <p:sldId id="288" r:id="rId26"/>
-    <p:sldId id="289" r:id="rId27"/>
-    <p:sldId id="290" r:id="rId28"/>
-    <p:sldId id="291" r:id="rId29"/>
-    <p:sldId id="272" r:id="rId30"/>
-    <p:sldId id="266" r:id="rId31"/>
+    <p:sldId id="287" r:id="rId21"/>
+    <p:sldId id="272" r:id="rId22"/>
+    <p:sldId id="266" r:id="rId23"/>
   </p:sldIdLst>
   <p:sldSz cx="12192000" cy="6858000"/>
   <p:notesSz cx="6858000" cy="9144000"/>
@@ -226,7 +218,7 @@
           <a:p>
             <a:fld id="{5E1C974E-C9BD-9641-8D44-C4BB718C47BA}" type="datetimeFigureOut">
               <a:rPr lang="en-EG" smtClean="0"/>
-              <a:t>8/27/22</a:t>
+              <a:t>8/29/22</a:t>
             </a:fld>
             <a:endParaRPr lang="en-EG"/>
           </a:p>
@@ -826,7 +818,7 @@
             <a:fld id="{5923F103-BC34-4FE4-A40E-EDDEECFDA5D0}" type="datetimeFigureOut">
               <a:rPr lang="en-US" smtClean="0"/>
               <a:pPr/>
-              <a:t>8/27/22</a:t>
+              <a:t>8/29/22</a:t>
             </a:fld>
             <a:endParaRPr lang="en-US" dirty="0"/>
           </a:p>
@@ -1151,7 +1143,7 @@
           <a:p>
             <a:fld id="{2BE451C3-0FF4-47C4-B829-773ADF60F88C}" type="datetimeFigureOut">
               <a:rPr lang="en-US" smtClean="0"/>
-              <a:t>8/27/22</a:t>
+              <a:t>8/29/22</a:t>
             </a:fld>
             <a:endParaRPr lang="en-US" dirty="0"/>
           </a:p>
@@ -1401,7 +1393,7 @@
           <a:p>
             <a:fld id="{2BE451C3-0FF4-47C4-B829-773ADF60F88C}" type="datetimeFigureOut">
               <a:rPr lang="en-US" smtClean="0"/>
-              <a:t>8/27/22</a:t>
+              <a:t>8/29/22</a:t>
             </a:fld>
             <a:endParaRPr lang="en-US" dirty="0"/>
           </a:p>
@@ -1742,7 +1734,7 @@
           <a:p>
             <a:fld id="{2BE451C3-0FF4-47C4-B829-773ADF60F88C}" type="datetimeFigureOut">
               <a:rPr lang="en-US" smtClean="0"/>
-              <a:t>8/27/22</a:t>
+              <a:t>8/29/22</a:t>
             </a:fld>
             <a:endParaRPr lang="en-US" dirty="0"/>
           </a:p>
@@ -2091,7 +2083,7 @@
           <a:p>
             <a:fld id="{2BE451C3-0FF4-47C4-B829-773ADF60F88C}" type="datetimeFigureOut">
               <a:rPr lang="en-US" smtClean="0"/>
-              <a:t>8/27/22</a:t>
+              <a:t>8/29/22</a:t>
             </a:fld>
             <a:endParaRPr lang="en-US" dirty="0"/>
           </a:p>
@@ -2467,7 +2459,7 @@
           <a:p>
             <a:fld id="{2BE451C3-0FF4-47C4-B829-773ADF60F88C}" type="datetimeFigureOut">
               <a:rPr lang="en-US" smtClean="0"/>
-              <a:t>8/27/22</a:t>
+              <a:t>8/29/22</a:t>
             </a:fld>
             <a:endParaRPr lang="en-US" dirty="0"/>
           </a:p>
@@ -2939,7 +2931,7 @@
           <a:p>
             <a:fld id="{2BE451C3-0FF4-47C4-B829-773ADF60F88C}" type="datetimeFigureOut">
               <a:rPr lang="en-US" smtClean="0"/>
-              <a:t>8/27/22</a:t>
+              <a:t>8/29/22</a:t>
             </a:fld>
             <a:endParaRPr lang="en-US" dirty="0"/>
           </a:p>
@@ -3146,7 +3138,7 @@
           <a:p>
             <a:fld id="{53086D93-FCAC-47E0-A2EE-787E62CA814C}" type="datetimeFigureOut">
               <a:rPr lang="en-US" smtClean="0"/>
-              <a:t>8/27/22</a:t>
+              <a:t>8/29/22</a:t>
             </a:fld>
             <a:endParaRPr lang="en-US" dirty="0"/>
           </a:p>
@@ -3358,7 +3350,7 @@
           <a:p>
             <a:fld id="{CDA879A6-0FD0-4734-A311-86BFCA472E6E}" type="datetimeFigureOut">
               <a:rPr lang="en-US" smtClean="0"/>
-              <a:t>8/27/22</a:t>
+              <a:t>8/29/22</a:t>
             </a:fld>
             <a:endParaRPr lang="en-US" dirty="0"/>
           </a:p>
@@ -3591,7 +3583,7 @@
           <a:p>
             <a:fld id="{19C9CA7B-DFD4-44B5-8C60-D14B8CD1FB59}" type="datetimeFigureOut">
               <a:rPr lang="en-US" smtClean="0"/>
-              <a:t>8/27/22</a:t>
+              <a:t>8/29/22</a:t>
             </a:fld>
             <a:endParaRPr lang="en-US" dirty="0"/>
           </a:p>
@@ -3840,7 +3832,7 @@
           <a:p>
             <a:fld id="{F34E6425-0181-43F2-84FC-787E803FD2F8}" type="datetimeFigureOut">
               <a:rPr lang="en-US" smtClean="0"/>
-              <a:t>8/27/22</a:t>
+              <a:t>8/29/22</a:t>
             </a:fld>
             <a:endParaRPr lang="en-US" dirty="0"/>
           </a:p>
@@ -4139,7 +4131,7 @@
           <a:p>
             <a:fld id="{3BDB8791-F1B0-41E7-B7FD-A781E65C4266}" type="datetimeFigureOut">
               <a:rPr lang="en-US" smtClean="0"/>
-              <a:t>8/27/22</a:t>
+              <a:t>8/29/22</a:t>
             </a:fld>
             <a:endParaRPr lang="en-US" dirty="0"/>
           </a:p>
@@ -4534,7 +4526,7 @@
           <a:p>
             <a:fld id="{2BE451C3-0FF4-47C4-B829-773ADF60F88C}" type="datetimeFigureOut">
               <a:rPr lang="en-US" smtClean="0"/>
-              <a:t>8/27/22</a:t>
+              <a:t>8/29/22</a:t>
             </a:fld>
             <a:endParaRPr lang="en-US" dirty="0"/>
           </a:p>
@@ -4685,7 +4677,7 @@
           <a:p>
             <a:fld id="{7AA18ACC-A947-437B-A130-35BD54FDF1E9}" type="datetimeFigureOut">
               <a:rPr lang="en-US" smtClean="0"/>
-              <a:t>8/27/22</a:t>
+              <a:t>8/29/22</a:t>
             </a:fld>
             <a:endParaRPr lang="en-US" dirty="0"/>
           </a:p>
@@ -4812,7 +4804,7 @@
           <a:p>
             <a:fld id="{7C8D7E02-BCB8-4D50-A234-369438C08659}" type="datetimeFigureOut">
               <a:rPr lang="en-US" smtClean="0"/>
-              <a:t>8/27/22</a:t>
+              <a:t>8/29/22</a:t>
             </a:fld>
             <a:endParaRPr lang="en-US" dirty="0"/>
           </a:p>
@@ -5068,7 +5060,7 @@
           <a:p>
             <a:fld id="{76E86A4C-8E40-4F87-A4F0-01A0687C5742}" type="datetimeFigureOut">
               <a:rPr lang="en-US" smtClean="0"/>
-              <a:t>8/27/22</a:t>
+              <a:t>8/29/22</a:t>
             </a:fld>
             <a:endParaRPr lang="en-US" dirty="0"/>
           </a:p>
@@ -5384,7 +5376,7 @@
           <a:p>
             <a:fld id="{35E72C73-2D91-4E12-BA25-F0AA0C03599B}" type="datetimeFigureOut">
               <a:rPr lang="en-US" smtClean="0"/>
-              <a:t>8/27/22</a:t>
+              <a:t>8/29/22</a:t>
             </a:fld>
             <a:endParaRPr lang="en-US" dirty="0"/>
           </a:p>
@@ -5736,7 +5728,7 @@
           <a:p>
             <a:fld id="{2BE451C3-0FF4-47C4-B829-773ADF60F88C}" type="datetimeFigureOut">
               <a:rPr lang="en-US" smtClean="0"/>
-              <a:t>8/27/22</a:t>
+              <a:t>8/29/22</a:t>
             </a:fld>
             <a:endParaRPr lang="en-US" dirty="0"/>
           </a:p>
@@ -6835,7 +6827,7 @@
           <p:cNvPr id="2" name="Title 1">
             <a:extLst>
               <a:ext uri="{FF2B5EF4-FFF2-40B4-BE49-F238E27FC236}">
-                <a16:creationId xmlns:a16="http://schemas.microsoft.com/office/drawing/2014/main" id="{C60D3576-9A44-B730-3607-BBA1AEAA135E}"/>
+                <a16:creationId xmlns:a16="http://schemas.microsoft.com/office/drawing/2014/main" id="{19D9F895-3774-FFB0-91BF-886F0ACA75B4}"/>
               </a:ext>
             </a:extLst>
           </p:cNvPr>
@@ -6852,46 +6844,45 @@
           <a:lstStyle/>
           <a:p>
             <a:r>
-              <a:rPr lang="en-US" dirty="0"/>
-              <a:t>Dimensionality Reduction</a:t>
-            </a:r>
-            <a:endParaRPr lang="en-EG" dirty="0"/>
-          </a:p>
-        </p:txBody>
-      </p:sp>
-      <p:sp>
-        <p:nvSpPr>
-          <p:cNvPr id="3" name="Content Placeholder 2">
+              <a:rPr lang="en-EG" dirty="0"/>
+              <a:t>Scaling data</a:t>
+            </a:r>
+          </a:p>
+        </p:txBody>
+      </p:sp>
+      <p:pic>
+        <p:nvPicPr>
+          <p:cNvPr id="5" name="Content Placeholder 4" descr="Chart, histogram&#10;&#10;Description automatically generated">
             <a:extLst>
               <a:ext uri="{FF2B5EF4-FFF2-40B4-BE49-F238E27FC236}">
-                <a16:creationId xmlns:a16="http://schemas.microsoft.com/office/drawing/2014/main" id="{6A94E1D8-3FC2-5CCB-8DB0-6F05602A031C}"/>
+                <a16:creationId xmlns:a16="http://schemas.microsoft.com/office/drawing/2014/main" id="{96161AD4-B0CB-30E9-059E-4157A465FB45}"/>
               </a:ext>
             </a:extLst>
           </p:cNvPr>
-          <p:cNvSpPr>
-            <a:spLocks noGrp="1"/>
-          </p:cNvSpPr>
+          <p:cNvPicPr>
+            <a:picLocks noGrp="1" noChangeAspect="1"/>
+          </p:cNvPicPr>
           <p:nvPr>
             <p:ph idx="1"/>
           </p:nvPr>
-        </p:nvSpPr>
-        <p:spPr/>
-        <p:txBody>
-          <a:bodyPr/>
-          <a:lstStyle/>
-          <a:p>
-            <a:r>
-              <a:rPr lang="en-US" dirty="0"/>
-              <a:t>perform a principal component analysis to reduce the dimensions of your data and provide a useful interpretation of the results (Provide your interpretation in four (4) bullet points-maximum). </a:t>
-            </a:r>
-            <a:endParaRPr lang="en-EG" dirty="0"/>
-          </a:p>
-        </p:txBody>
-      </p:sp>
+        </p:nvPicPr>
+        <p:blipFill>
+          <a:blip r:embed="rId2"/>
+          <a:stretch>
+            <a:fillRect/>
+          </a:stretch>
+        </p:blipFill>
+        <p:spPr>
+          <a:xfrm>
+            <a:off x="3409897" y="2557463"/>
+            <a:ext cx="5372206" cy="3317875"/>
+          </a:xfrm>
+        </p:spPr>
+      </p:pic>
     </p:spTree>
     <p:extLst>
       <p:ext uri="{BB962C8B-B14F-4D97-AF65-F5344CB8AC3E}">
-        <p14:creationId xmlns:p14="http://schemas.microsoft.com/office/powerpoint/2010/main" val="3522847064"/>
+        <p14:creationId xmlns:p14="http://schemas.microsoft.com/office/powerpoint/2010/main" val="1453446853"/>
       </p:ext>
     </p:extLst>
   </p:cSld>
@@ -6923,7 +6914,7 @@
           <p:cNvPr id="2" name="Title 1">
             <a:extLst>
               <a:ext uri="{FF2B5EF4-FFF2-40B4-BE49-F238E27FC236}">
-                <a16:creationId xmlns:a16="http://schemas.microsoft.com/office/drawing/2014/main" id="{0F5A4FC4-747C-C196-A85A-F1331541BFEE}"/>
+                <a16:creationId xmlns:a16="http://schemas.microsoft.com/office/drawing/2014/main" id="{C60D3576-9A44-B730-3607-BBA1AEAA135E}"/>
               </a:ext>
             </a:extLst>
           </p:cNvPr>
@@ -6941,7 +6932,7 @@
           <a:p>
             <a:r>
               <a:rPr lang="en-US" dirty="0"/>
-              <a:t>Task 2 - User Engagement analysis</a:t>
+              <a:t>Dimensionality Reduction</a:t>
             </a:r>
             <a:endParaRPr lang="en-EG" dirty="0"/>
           </a:p>
@@ -6952,7 +6943,7 @@
           <p:cNvPr id="3" name="Content Placeholder 2">
             <a:extLst>
               <a:ext uri="{FF2B5EF4-FFF2-40B4-BE49-F238E27FC236}">
-                <a16:creationId xmlns:a16="http://schemas.microsoft.com/office/drawing/2014/main" id="{5AEF9C1D-B704-2D20-A72E-CA100853C76F}"/>
+                <a16:creationId xmlns:a16="http://schemas.microsoft.com/office/drawing/2014/main" id="{6A94E1D8-3FC2-5CCB-8DB0-6F05602A031C}"/>
               </a:ext>
             </a:extLst>
           </p:cNvPr>
@@ -6968,14 +6959,18 @@
           <a:bodyPr/>
           <a:lstStyle/>
           <a:p>
-            <a:endParaRPr lang="en-EG"/>
+            <a:r>
+              <a:rPr lang="en-US" dirty="0"/>
+              <a:t>perform a principal component analysis to reduce the dimensions of your data and provide a useful interpretation of the results (Provide your interpretation in four (4) bullet points-maximum). </a:t>
+            </a:r>
+            <a:endParaRPr lang="en-EG" dirty="0"/>
           </a:p>
         </p:txBody>
       </p:sp>
     </p:spTree>
     <p:extLst>
       <p:ext uri="{BB962C8B-B14F-4D97-AF65-F5344CB8AC3E}">
-        <p14:creationId xmlns:p14="http://schemas.microsoft.com/office/powerpoint/2010/main" val="1022893682"/>
+        <p14:creationId xmlns:p14="http://schemas.microsoft.com/office/powerpoint/2010/main" val="3522847064"/>
       </p:ext>
     </p:extLst>
   </p:cSld>
@@ -7007,7 +7002,7 @@
           <p:cNvPr id="2" name="Title 1">
             <a:extLst>
               <a:ext uri="{FF2B5EF4-FFF2-40B4-BE49-F238E27FC236}">
-                <a16:creationId xmlns:a16="http://schemas.microsoft.com/office/drawing/2014/main" id="{0C23751F-552F-D332-DDF7-37286F693354}"/>
+                <a16:creationId xmlns:a16="http://schemas.microsoft.com/office/drawing/2014/main" id="{0F5A4FC4-747C-C196-A85A-F1331541BFEE}"/>
               </a:ext>
             </a:extLst>
           </p:cNvPr>
@@ -7023,39 +7018,47 @@
           <a:bodyPr/>
           <a:lstStyle/>
           <a:p>
-            <a:endParaRPr lang="en-EG"/>
-          </a:p>
-        </p:txBody>
-      </p:sp>
-      <p:sp>
-        <p:nvSpPr>
-          <p:cNvPr id="3" name="Content Placeholder 2">
+            <a:r>
+              <a:rPr lang="en-US" dirty="0"/>
+              <a:t>Task 2 - User Engagement analysis</a:t>
+            </a:r>
+            <a:endParaRPr lang="en-EG" dirty="0"/>
+          </a:p>
+        </p:txBody>
+      </p:sp>
+      <p:pic>
+        <p:nvPicPr>
+          <p:cNvPr id="5" name="Content Placeholder 4" descr="Shape, square&#10;&#10;Description automatically generated">
             <a:extLst>
               <a:ext uri="{FF2B5EF4-FFF2-40B4-BE49-F238E27FC236}">
-                <a16:creationId xmlns:a16="http://schemas.microsoft.com/office/drawing/2014/main" id="{41FD0C72-15E4-31BE-5F40-8CCD12FE086C}"/>
+                <a16:creationId xmlns:a16="http://schemas.microsoft.com/office/drawing/2014/main" id="{011A8827-08EC-F980-C875-64543943F0F2}"/>
               </a:ext>
             </a:extLst>
           </p:cNvPr>
-          <p:cNvSpPr>
-            <a:spLocks noGrp="1"/>
-          </p:cNvSpPr>
+          <p:cNvPicPr>
+            <a:picLocks noGrp="1" noChangeAspect="1"/>
+          </p:cNvPicPr>
           <p:nvPr>
             <p:ph idx="1"/>
           </p:nvPr>
-        </p:nvSpPr>
-        <p:spPr/>
-        <p:txBody>
-          <a:bodyPr/>
-          <a:lstStyle/>
-          <a:p>
-            <a:endParaRPr lang="en-EG"/>
-          </a:p>
-        </p:txBody>
-      </p:sp>
+        </p:nvPicPr>
+        <p:blipFill>
+          <a:blip r:embed="rId2"/>
+          <a:stretch>
+            <a:fillRect/>
+          </a:stretch>
+        </p:blipFill>
+        <p:spPr>
+          <a:xfrm>
+            <a:off x="3609325" y="2557463"/>
+            <a:ext cx="4973349" cy="3317875"/>
+          </a:xfrm>
+        </p:spPr>
+      </p:pic>
     </p:spTree>
     <p:extLst>
       <p:ext uri="{BB962C8B-B14F-4D97-AF65-F5344CB8AC3E}">
-        <p14:creationId xmlns:p14="http://schemas.microsoft.com/office/powerpoint/2010/main" val="1597569419"/>
+        <p14:creationId xmlns:p14="http://schemas.microsoft.com/office/powerpoint/2010/main" val="1022893682"/>
       </p:ext>
     </p:extLst>
   </p:cSld>
@@ -7087,7 +7090,7 @@
           <p:cNvPr id="2" name="Title 1">
             <a:extLst>
               <a:ext uri="{FF2B5EF4-FFF2-40B4-BE49-F238E27FC236}">
-                <a16:creationId xmlns:a16="http://schemas.microsoft.com/office/drawing/2014/main" id="{9E6C5F66-4913-F683-8EB6-02A8EA362C91}"/>
+                <a16:creationId xmlns:a16="http://schemas.microsoft.com/office/drawing/2014/main" id="{0C23751F-552F-D332-DDF7-37286F693354}"/>
               </a:ext>
             </a:extLst>
           </p:cNvPr>
@@ -7103,39 +7106,47 @@
           <a:bodyPr/>
           <a:lstStyle/>
           <a:p>
-            <a:endParaRPr lang="en-EG"/>
-          </a:p>
-        </p:txBody>
-      </p:sp>
-      <p:sp>
-        <p:nvSpPr>
-          <p:cNvPr id="3" name="Content Placeholder 2">
+            <a:r>
+              <a:rPr lang="en-US" dirty="0"/>
+              <a:t>User Engagement analysis</a:t>
+            </a:r>
+            <a:endParaRPr lang="en-EG" dirty="0"/>
+          </a:p>
+        </p:txBody>
+      </p:sp>
+      <p:pic>
+        <p:nvPicPr>
+          <p:cNvPr id="5" name="Content Placeholder 4" descr="Chart, pie chart&#10;&#10;Description automatically generated">
             <a:extLst>
               <a:ext uri="{FF2B5EF4-FFF2-40B4-BE49-F238E27FC236}">
-                <a16:creationId xmlns:a16="http://schemas.microsoft.com/office/drawing/2014/main" id="{56162AE7-CABE-78CC-79CC-41A695083E21}"/>
+                <a16:creationId xmlns:a16="http://schemas.microsoft.com/office/drawing/2014/main" id="{991B82EA-5437-31AE-360A-DCE942CBA30E}"/>
               </a:ext>
             </a:extLst>
           </p:cNvPr>
-          <p:cNvSpPr>
-            <a:spLocks noGrp="1"/>
-          </p:cNvSpPr>
+          <p:cNvPicPr>
+            <a:picLocks noGrp="1" noChangeAspect="1"/>
+          </p:cNvPicPr>
           <p:nvPr>
             <p:ph idx="1"/>
           </p:nvPr>
-        </p:nvSpPr>
-        <p:spPr/>
-        <p:txBody>
-          <a:bodyPr/>
-          <a:lstStyle/>
-          <a:p>
-            <a:endParaRPr lang="en-EG"/>
-          </a:p>
-        </p:txBody>
-      </p:sp>
+        </p:nvPicPr>
+        <p:blipFill>
+          <a:blip r:embed="rId2"/>
+          <a:stretch>
+            <a:fillRect/>
+          </a:stretch>
+        </p:blipFill>
+        <p:spPr>
+          <a:xfrm>
+            <a:off x="3845413" y="2557463"/>
+            <a:ext cx="4501173" cy="3317875"/>
+          </a:xfrm>
+        </p:spPr>
+      </p:pic>
     </p:spTree>
     <p:extLst>
       <p:ext uri="{BB962C8B-B14F-4D97-AF65-F5344CB8AC3E}">
-        <p14:creationId xmlns:p14="http://schemas.microsoft.com/office/powerpoint/2010/main" val="3607294821"/>
+        <p14:creationId xmlns:p14="http://schemas.microsoft.com/office/powerpoint/2010/main" val="1597569419"/>
       </p:ext>
     </p:extLst>
   </p:cSld>
@@ -7162,60 +7173,39 @@
           <a:chExt cx="0" cy="0"/>
         </a:xfrm>
       </p:grpSpPr>
-      <p:sp>
-        <p:nvSpPr>
-          <p:cNvPr id="2" name="Title 1">
+      <p:pic>
+        <p:nvPicPr>
+          <p:cNvPr id="5" name="Content Placeholder 4" descr="A picture containing shape&#10;&#10;Description automatically generated">
             <a:extLst>
               <a:ext uri="{FF2B5EF4-FFF2-40B4-BE49-F238E27FC236}">
-                <a16:creationId xmlns:a16="http://schemas.microsoft.com/office/drawing/2014/main" id="{5DE07A9F-F40A-1800-8E36-D442430671AA}"/>
+                <a16:creationId xmlns:a16="http://schemas.microsoft.com/office/drawing/2014/main" id="{24B47323-D069-45FC-26A1-B7123D6AC7D9}"/>
               </a:ext>
             </a:extLst>
           </p:cNvPr>
-          <p:cNvSpPr>
-            <a:spLocks noGrp="1"/>
-          </p:cNvSpPr>
-          <p:nvPr>
-            <p:ph type="title"/>
-          </p:nvPr>
-        </p:nvSpPr>
-        <p:spPr/>
-        <p:txBody>
-          <a:bodyPr/>
-          <a:lstStyle/>
-          <a:p>
-            <a:endParaRPr lang="en-EG"/>
-          </a:p>
-        </p:txBody>
-      </p:sp>
-      <p:sp>
-        <p:nvSpPr>
-          <p:cNvPr id="3" name="Content Placeholder 2">
-            <a:extLst>
-              <a:ext uri="{FF2B5EF4-FFF2-40B4-BE49-F238E27FC236}">
-                <a16:creationId xmlns:a16="http://schemas.microsoft.com/office/drawing/2014/main" id="{AB3CC24E-EAD5-EE22-9C82-DC249C55B031}"/>
-              </a:ext>
-            </a:extLst>
-          </p:cNvPr>
-          <p:cNvSpPr>
-            <a:spLocks noGrp="1"/>
-          </p:cNvSpPr>
+          <p:cNvPicPr>
+            <a:picLocks noGrp="1" noChangeAspect="1"/>
+          </p:cNvPicPr>
           <p:nvPr>
             <p:ph idx="1"/>
           </p:nvPr>
-        </p:nvSpPr>
-        <p:spPr/>
-        <p:txBody>
-          <a:bodyPr/>
-          <a:lstStyle/>
-          <a:p>
-            <a:endParaRPr lang="en-EG"/>
-          </a:p>
-        </p:txBody>
-      </p:sp>
+        </p:nvPicPr>
+        <p:blipFill>
+          <a:blip r:embed="rId2"/>
+          <a:stretch>
+            <a:fillRect/>
+          </a:stretch>
+        </p:blipFill>
+        <p:spPr>
+          <a:xfrm>
+            <a:off x="1883317" y="619570"/>
+            <a:ext cx="7933783" cy="5618860"/>
+          </a:xfrm>
+        </p:spPr>
+      </p:pic>
     </p:spTree>
     <p:extLst>
       <p:ext uri="{BB962C8B-B14F-4D97-AF65-F5344CB8AC3E}">
-        <p14:creationId xmlns:p14="http://schemas.microsoft.com/office/powerpoint/2010/main" val="1015788110"/>
+        <p14:creationId xmlns:p14="http://schemas.microsoft.com/office/powerpoint/2010/main" val="3607294821"/>
       </p:ext>
     </p:extLst>
   </p:cSld>
@@ -7247,7 +7237,7 @@
           <p:cNvPr id="2" name="Title 1">
             <a:extLst>
               <a:ext uri="{FF2B5EF4-FFF2-40B4-BE49-F238E27FC236}">
-                <a16:creationId xmlns:a16="http://schemas.microsoft.com/office/drawing/2014/main" id="{19D9F895-3774-FFB0-91BF-886F0ACA75B4}"/>
+                <a16:creationId xmlns:a16="http://schemas.microsoft.com/office/drawing/2014/main" id="{5DE07A9F-F40A-1800-8E36-D442430671AA}"/>
               </a:ext>
             </a:extLst>
           </p:cNvPr>
@@ -7267,35 +7257,39 @@
           </a:p>
         </p:txBody>
       </p:sp>
-      <p:sp>
-        <p:nvSpPr>
-          <p:cNvPr id="3" name="Content Placeholder 2">
+      <p:pic>
+        <p:nvPicPr>
+          <p:cNvPr id="5" name="Content Placeholder 4">
             <a:extLst>
               <a:ext uri="{FF2B5EF4-FFF2-40B4-BE49-F238E27FC236}">
-                <a16:creationId xmlns:a16="http://schemas.microsoft.com/office/drawing/2014/main" id="{15143CDF-E4C4-CFB5-B5BE-C9E7D6873C2E}"/>
+                <a16:creationId xmlns:a16="http://schemas.microsoft.com/office/drawing/2014/main" id="{BCDA7081-C66A-F9F9-99A8-1C922B86296B}"/>
               </a:ext>
             </a:extLst>
           </p:cNvPr>
-          <p:cNvSpPr>
-            <a:spLocks noGrp="1"/>
-          </p:cNvSpPr>
+          <p:cNvPicPr>
+            <a:picLocks noGrp="1" noChangeAspect="1"/>
+          </p:cNvPicPr>
           <p:nvPr>
             <p:ph idx="1"/>
           </p:nvPr>
-        </p:nvSpPr>
-        <p:spPr/>
-        <p:txBody>
-          <a:bodyPr/>
-          <a:lstStyle/>
-          <a:p>
-            <a:endParaRPr lang="en-EG"/>
-          </a:p>
-        </p:txBody>
-      </p:sp>
+        </p:nvPicPr>
+        <p:blipFill>
+          <a:blip r:embed="rId2"/>
+          <a:stretch>
+            <a:fillRect/>
+          </a:stretch>
+        </p:blipFill>
+        <p:spPr>
+          <a:xfrm>
+            <a:off x="2391189" y="982132"/>
+            <a:ext cx="7003560" cy="4558748"/>
+          </a:xfrm>
+        </p:spPr>
+      </p:pic>
     </p:spTree>
     <p:extLst>
       <p:ext uri="{BB962C8B-B14F-4D97-AF65-F5344CB8AC3E}">
-        <p14:creationId xmlns:p14="http://schemas.microsoft.com/office/powerpoint/2010/main" val="1453446853"/>
+        <p14:creationId xmlns:p14="http://schemas.microsoft.com/office/powerpoint/2010/main" val="1015788110"/>
       </p:ext>
     </p:extLst>
   </p:cSld>
@@ -7584,7 +7578,7 @@
           <p:cNvPr id="2" name="Title 1">
             <a:extLst>
               <a:ext uri="{FF2B5EF4-FFF2-40B4-BE49-F238E27FC236}">
-                <a16:creationId xmlns:a16="http://schemas.microsoft.com/office/drawing/2014/main" id="{D356C935-DD5E-CA9E-6B58-05F21FA134E3}"/>
+                <a16:creationId xmlns:a16="http://schemas.microsoft.com/office/drawing/2014/main" id="{739DFCE0-F1D1-48A4-A69E-800B5F6ECCF7}"/>
               </a:ext>
             </a:extLst>
           </p:cNvPr>
@@ -7600,7 +7594,11 @@
           <a:bodyPr/>
           <a:lstStyle/>
           <a:p>
-            <a:endParaRPr lang="en-EG"/>
+            <a:r>
+              <a:rPr lang="en-US" dirty="0"/>
+              <a:t>Task 4 - Satisfaction Analysis</a:t>
+            </a:r>
+            <a:endParaRPr lang="en-EG" dirty="0"/>
           </a:p>
         </p:txBody>
       </p:sp>
@@ -7609,7 +7607,7 @@
           <p:cNvPr id="3" name="Content Placeholder 2">
             <a:extLst>
               <a:ext uri="{FF2B5EF4-FFF2-40B4-BE49-F238E27FC236}">
-                <a16:creationId xmlns:a16="http://schemas.microsoft.com/office/drawing/2014/main" id="{A5C23B76-D06C-F532-A38E-6E1B75D1DBA9}"/>
+                <a16:creationId xmlns:a16="http://schemas.microsoft.com/office/drawing/2014/main" id="{AFCEED2C-E48E-7C62-5C02-B595314AE46F}"/>
               </a:ext>
             </a:extLst>
           </p:cNvPr>
@@ -7632,7 +7630,7 @@
     </p:spTree>
     <p:extLst>
       <p:ext uri="{BB962C8B-B14F-4D97-AF65-F5344CB8AC3E}">
-        <p14:creationId xmlns:p14="http://schemas.microsoft.com/office/powerpoint/2010/main" val="2916321479"/>
+        <p14:creationId xmlns:p14="http://schemas.microsoft.com/office/powerpoint/2010/main" val="1513510206"/>
       </p:ext>
     </p:extLst>
   </p:cSld>
@@ -7664,7 +7662,7 @@
           <p:cNvPr id="2" name="Title 1">
             <a:extLst>
               <a:ext uri="{FF2B5EF4-FFF2-40B4-BE49-F238E27FC236}">
-                <a16:creationId xmlns:a16="http://schemas.microsoft.com/office/drawing/2014/main" id="{0E7B7508-6410-B26F-49C7-710277EE7BC2}"/>
+                <a16:creationId xmlns:a16="http://schemas.microsoft.com/office/drawing/2014/main" id="{55E8C589-D0DD-F5FB-4CFD-A2571D02FF40}"/>
               </a:ext>
             </a:extLst>
           </p:cNvPr>
@@ -7680,7 +7678,14 @@
           <a:bodyPr/>
           <a:lstStyle/>
           <a:p>
-            <a:endParaRPr lang="en-EG"/>
+            <a:r>
+              <a:rPr lang="en-US" dirty="0"/>
+              <a:t>C</a:t>
+            </a:r>
+            <a:r>
+              <a:rPr lang="en-EG" dirty="0"/>
+              <a:t>onclusion </a:t>
+            </a:r>
           </a:p>
         </p:txBody>
       </p:sp>
@@ -7689,7 +7694,7 @@
           <p:cNvPr id="3" name="Content Placeholder 2">
             <a:extLst>
               <a:ext uri="{FF2B5EF4-FFF2-40B4-BE49-F238E27FC236}">
-                <a16:creationId xmlns:a16="http://schemas.microsoft.com/office/drawing/2014/main" id="{E689231C-6870-AEB3-AC04-BA3D22F6E12F}"/>
+                <a16:creationId xmlns:a16="http://schemas.microsoft.com/office/drawing/2014/main" id="{BA27E17E-F0CA-828E-2C1F-D4E080C62306}"/>
               </a:ext>
             </a:extLst>
           </p:cNvPr>
@@ -7705,14 +7710,39 @@
           <a:bodyPr/>
           <a:lstStyle/>
           <a:p>
-            <a:endParaRPr lang="en-EG"/>
+            <a:r>
+              <a:rPr lang="en-US" dirty="0"/>
+              <a:t>W</a:t>
+            </a:r>
+            <a:r>
+              <a:rPr lang="en-EG" dirty="0"/>
+              <a:t>e have seen that users are using our services</a:t>
+            </a:r>
+            <a:endParaRPr lang="en-US" dirty="0"/>
+          </a:p>
+          <a:p>
+            <a:r>
+              <a:rPr lang="en-EG" dirty="0"/>
+              <a:t>The engagement analysis has show that gaming is dominating so we nned to put effort in this area.</a:t>
+            </a:r>
+          </a:p>
+          <a:p>
+            <a:pPr lvl="1"/>
+            <a:endParaRPr lang="en-EG" dirty="0"/>
+          </a:p>
+          <a:p>
+            <a:pPr lvl="1"/>
+            <a:r>
+              <a:rPr lang="en-EG" dirty="0"/>
+              <a:t>Note: the tasks are not all accomplished, but the process was reaveling some import insights. I will carry on after finishing this week’s (week 2) challenge.</a:t>
+            </a:r>
           </a:p>
         </p:txBody>
       </p:sp>
     </p:spTree>
     <p:extLst>
       <p:ext uri="{BB962C8B-B14F-4D97-AF65-F5344CB8AC3E}">
-        <p14:creationId xmlns:p14="http://schemas.microsoft.com/office/powerpoint/2010/main" val="3953832886"/>
+        <p14:creationId xmlns:p14="http://schemas.microsoft.com/office/powerpoint/2010/main" val="2145198974"/>
       </p:ext>
     </p:extLst>
   </p:cSld>
@@ -7744,7 +7774,7 @@
           <p:cNvPr id="2" name="Title 1">
             <a:extLst>
               <a:ext uri="{FF2B5EF4-FFF2-40B4-BE49-F238E27FC236}">
-                <a16:creationId xmlns:a16="http://schemas.microsoft.com/office/drawing/2014/main" id="{67D055CE-E9BD-E8E8-4198-E6FA6ECA14BB}"/>
+                <a16:creationId xmlns:a16="http://schemas.microsoft.com/office/drawing/2014/main" id="{930DAD1A-FF01-7641-A0CC-0A8CB6AF9516}"/>
               </a:ext>
             </a:extLst>
           </p:cNvPr>
@@ -7760,647 +7790,46 @@
           <a:bodyPr/>
           <a:lstStyle/>
           <a:p>
-            <a:endParaRPr lang="en-EG"/>
-          </a:p>
-        </p:txBody>
-      </p:sp>
-      <p:sp>
-        <p:nvSpPr>
-          <p:cNvPr id="3" name="Content Placeholder 2">
+            <a:r>
+              <a:rPr lang="en-US" dirty="0"/>
+              <a:t>END</a:t>
+            </a:r>
+          </a:p>
+        </p:txBody>
+      </p:sp>
+      <p:pic>
+        <p:nvPicPr>
+          <p:cNvPr id="5" name="Content Placeholder 4">
             <a:extLst>
               <a:ext uri="{FF2B5EF4-FFF2-40B4-BE49-F238E27FC236}">
-                <a16:creationId xmlns:a16="http://schemas.microsoft.com/office/drawing/2014/main" id="{F178E18D-02D4-4B67-4D01-F92A42B417BA}"/>
+                <a16:creationId xmlns:a16="http://schemas.microsoft.com/office/drawing/2014/main" id="{7142BD6D-643A-AA7B-4FA1-2187A8A5B325}"/>
               </a:ext>
             </a:extLst>
           </p:cNvPr>
-          <p:cNvSpPr>
-            <a:spLocks noGrp="1"/>
-          </p:cNvSpPr>
+          <p:cNvPicPr>
+            <a:picLocks noGrp="1" noChangeAspect="1"/>
+          </p:cNvPicPr>
           <p:nvPr>
             <p:ph idx="1"/>
           </p:nvPr>
-        </p:nvSpPr>
-        <p:spPr/>
-        <p:txBody>
-          <a:bodyPr/>
-          <a:lstStyle/>
-          <a:p>
-            <a:endParaRPr lang="en-EG"/>
-          </a:p>
-        </p:txBody>
-      </p:sp>
+        </p:nvPicPr>
+        <p:blipFill>
+          <a:blip r:embed="rId2"/>
+          <a:stretch>
+            <a:fillRect/>
+          </a:stretch>
+        </p:blipFill>
+        <p:spPr>
+          <a:xfrm>
+            <a:off x="3606038" y="2557463"/>
+            <a:ext cx="4979924" cy="3317875"/>
+          </a:xfrm>
+        </p:spPr>
+      </p:pic>
     </p:spTree>
     <p:extLst>
       <p:ext uri="{BB962C8B-B14F-4D97-AF65-F5344CB8AC3E}">
-        <p14:creationId xmlns:p14="http://schemas.microsoft.com/office/powerpoint/2010/main" val="2668454459"/>
-      </p:ext>
-    </p:extLst>
-  </p:cSld>
-  <p:clrMapOvr>
-    <a:masterClrMapping/>
-  </p:clrMapOvr>
-</p:sld>
-</file>
-
-<file path=ppt/slides/slide23.xml><?xml version="1.0" encoding="utf-8"?>
-<p:sld xmlns:a="http://schemas.openxmlformats.org/drawingml/2006/main" xmlns:r="http://schemas.openxmlformats.org/officeDocument/2006/relationships" xmlns:p="http://schemas.openxmlformats.org/presentationml/2006/main">
-  <p:cSld>
-    <p:spTree>
-      <p:nvGrpSpPr>
-        <p:cNvPr id="1" name=""/>
-        <p:cNvGrpSpPr/>
-        <p:nvPr/>
-      </p:nvGrpSpPr>
-      <p:grpSpPr>
-        <a:xfrm>
-          <a:off x="0" y="0"/>
-          <a:ext cx="0" cy="0"/>
-          <a:chOff x="0" y="0"/>
-          <a:chExt cx="0" cy="0"/>
-        </a:xfrm>
-      </p:grpSpPr>
-      <p:sp>
-        <p:nvSpPr>
-          <p:cNvPr id="2" name="Title 1">
-            <a:extLst>
-              <a:ext uri="{FF2B5EF4-FFF2-40B4-BE49-F238E27FC236}">
-                <a16:creationId xmlns:a16="http://schemas.microsoft.com/office/drawing/2014/main" id="{C16E3DA9-E240-CC53-CACF-73E47D1A1CE2}"/>
-              </a:ext>
-            </a:extLst>
-          </p:cNvPr>
-          <p:cNvSpPr>
-            <a:spLocks noGrp="1"/>
-          </p:cNvSpPr>
-          <p:nvPr>
-            <p:ph type="title"/>
-          </p:nvPr>
-        </p:nvSpPr>
-        <p:spPr/>
-        <p:txBody>
-          <a:bodyPr/>
-          <a:lstStyle/>
-          <a:p>
-            <a:endParaRPr lang="en-EG"/>
-          </a:p>
-        </p:txBody>
-      </p:sp>
-      <p:sp>
-        <p:nvSpPr>
-          <p:cNvPr id="3" name="Content Placeholder 2">
-            <a:extLst>
-              <a:ext uri="{FF2B5EF4-FFF2-40B4-BE49-F238E27FC236}">
-                <a16:creationId xmlns:a16="http://schemas.microsoft.com/office/drawing/2014/main" id="{AE80C112-1EB8-3CE6-0566-0EB68F037B3B}"/>
-              </a:ext>
-            </a:extLst>
-          </p:cNvPr>
-          <p:cNvSpPr>
-            <a:spLocks noGrp="1"/>
-          </p:cNvSpPr>
-          <p:nvPr>
-            <p:ph idx="1"/>
-          </p:nvPr>
-        </p:nvSpPr>
-        <p:spPr/>
-        <p:txBody>
-          <a:bodyPr/>
-          <a:lstStyle/>
-          <a:p>
-            <a:endParaRPr lang="en-EG"/>
-          </a:p>
-        </p:txBody>
-      </p:sp>
-    </p:spTree>
-    <p:extLst>
-      <p:ext uri="{BB962C8B-B14F-4D97-AF65-F5344CB8AC3E}">
-        <p14:creationId xmlns:p14="http://schemas.microsoft.com/office/powerpoint/2010/main" val="3499108226"/>
-      </p:ext>
-    </p:extLst>
-  </p:cSld>
-  <p:clrMapOvr>
-    <a:masterClrMapping/>
-  </p:clrMapOvr>
-</p:sld>
-</file>
-
-<file path=ppt/slides/slide24.xml><?xml version="1.0" encoding="utf-8"?>
-<p:sld xmlns:a="http://schemas.openxmlformats.org/drawingml/2006/main" xmlns:r="http://schemas.openxmlformats.org/officeDocument/2006/relationships" xmlns:p="http://schemas.openxmlformats.org/presentationml/2006/main">
-  <p:cSld>
-    <p:spTree>
-      <p:nvGrpSpPr>
-        <p:cNvPr id="1" name=""/>
-        <p:cNvGrpSpPr/>
-        <p:nvPr/>
-      </p:nvGrpSpPr>
-      <p:grpSpPr>
-        <a:xfrm>
-          <a:off x="0" y="0"/>
-          <a:ext cx="0" cy="0"/>
-          <a:chOff x="0" y="0"/>
-          <a:chExt cx="0" cy="0"/>
-        </a:xfrm>
-      </p:grpSpPr>
-      <p:sp>
-        <p:nvSpPr>
-          <p:cNvPr id="2" name="Title 1">
-            <a:extLst>
-              <a:ext uri="{FF2B5EF4-FFF2-40B4-BE49-F238E27FC236}">
-                <a16:creationId xmlns:a16="http://schemas.microsoft.com/office/drawing/2014/main" id="{739DFCE0-F1D1-48A4-A69E-800B5F6ECCF7}"/>
-              </a:ext>
-            </a:extLst>
-          </p:cNvPr>
-          <p:cNvSpPr>
-            <a:spLocks noGrp="1"/>
-          </p:cNvSpPr>
-          <p:nvPr>
-            <p:ph type="title"/>
-          </p:nvPr>
-        </p:nvSpPr>
-        <p:spPr/>
-        <p:txBody>
-          <a:bodyPr/>
-          <a:lstStyle/>
-          <a:p>
-            <a:r>
-              <a:rPr lang="en-US" dirty="0"/>
-              <a:t>Task 4 - Satisfaction Analysis</a:t>
-            </a:r>
-            <a:endParaRPr lang="en-EG" dirty="0"/>
-          </a:p>
-        </p:txBody>
-      </p:sp>
-      <p:sp>
-        <p:nvSpPr>
-          <p:cNvPr id="3" name="Content Placeholder 2">
-            <a:extLst>
-              <a:ext uri="{FF2B5EF4-FFF2-40B4-BE49-F238E27FC236}">
-                <a16:creationId xmlns:a16="http://schemas.microsoft.com/office/drawing/2014/main" id="{AFCEED2C-E48E-7C62-5C02-B595314AE46F}"/>
-              </a:ext>
-            </a:extLst>
-          </p:cNvPr>
-          <p:cNvSpPr>
-            <a:spLocks noGrp="1"/>
-          </p:cNvSpPr>
-          <p:nvPr>
-            <p:ph idx="1"/>
-          </p:nvPr>
-        </p:nvSpPr>
-        <p:spPr/>
-        <p:txBody>
-          <a:bodyPr/>
-          <a:lstStyle/>
-          <a:p>
-            <a:endParaRPr lang="en-EG"/>
-          </a:p>
-        </p:txBody>
-      </p:sp>
-    </p:spTree>
-    <p:extLst>
-      <p:ext uri="{BB962C8B-B14F-4D97-AF65-F5344CB8AC3E}">
-        <p14:creationId xmlns:p14="http://schemas.microsoft.com/office/powerpoint/2010/main" val="1513510206"/>
-      </p:ext>
-    </p:extLst>
-  </p:cSld>
-  <p:clrMapOvr>
-    <a:masterClrMapping/>
-  </p:clrMapOvr>
-</p:sld>
-</file>
-
-<file path=ppt/slides/slide25.xml><?xml version="1.0" encoding="utf-8"?>
-<p:sld xmlns:a="http://schemas.openxmlformats.org/drawingml/2006/main" xmlns:r="http://schemas.openxmlformats.org/officeDocument/2006/relationships" xmlns:p="http://schemas.openxmlformats.org/presentationml/2006/main">
-  <p:cSld>
-    <p:spTree>
-      <p:nvGrpSpPr>
-        <p:cNvPr id="1" name=""/>
-        <p:cNvGrpSpPr/>
-        <p:nvPr/>
-      </p:nvGrpSpPr>
-      <p:grpSpPr>
-        <a:xfrm>
-          <a:off x="0" y="0"/>
-          <a:ext cx="0" cy="0"/>
-          <a:chOff x="0" y="0"/>
-          <a:chExt cx="0" cy="0"/>
-        </a:xfrm>
-      </p:grpSpPr>
-      <p:sp>
-        <p:nvSpPr>
-          <p:cNvPr id="2" name="Title 1">
-            <a:extLst>
-              <a:ext uri="{FF2B5EF4-FFF2-40B4-BE49-F238E27FC236}">
-                <a16:creationId xmlns:a16="http://schemas.microsoft.com/office/drawing/2014/main" id="{B1B9C91C-4D00-1A3F-82B6-3162DD9A4D23}"/>
-              </a:ext>
-            </a:extLst>
-          </p:cNvPr>
-          <p:cNvSpPr>
-            <a:spLocks noGrp="1"/>
-          </p:cNvSpPr>
-          <p:nvPr>
-            <p:ph type="title"/>
-          </p:nvPr>
-        </p:nvSpPr>
-        <p:spPr/>
-        <p:txBody>
-          <a:bodyPr/>
-          <a:lstStyle/>
-          <a:p>
-            <a:endParaRPr lang="en-EG"/>
-          </a:p>
-        </p:txBody>
-      </p:sp>
-      <p:sp>
-        <p:nvSpPr>
-          <p:cNvPr id="3" name="Content Placeholder 2">
-            <a:extLst>
-              <a:ext uri="{FF2B5EF4-FFF2-40B4-BE49-F238E27FC236}">
-                <a16:creationId xmlns:a16="http://schemas.microsoft.com/office/drawing/2014/main" id="{7C9F7DF6-6A5A-5CCE-F397-5FD8644ECFAE}"/>
-              </a:ext>
-            </a:extLst>
-          </p:cNvPr>
-          <p:cNvSpPr>
-            <a:spLocks noGrp="1"/>
-          </p:cNvSpPr>
-          <p:nvPr>
-            <p:ph idx="1"/>
-          </p:nvPr>
-        </p:nvSpPr>
-        <p:spPr/>
-        <p:txBody>
-          <a:bodyPr/>
-          <a:lstStyle/>
-          <a:p>
-            <a:endParaRPr lang="en-EG"/>
-          </a:p>
-        </p:txBody>
-      </p:sp>
-    </p:spTree>
-    <p:extLst>
-      <p:ext uri="{BB962C8B-B14F-4D97-AF65-F5344CB8AC3E}">
-        <p14:creationId xmlns:p14="http://schemas.microsoft.com/office/powerpoint/2010/main" val="1326469139"/>
-      </p:ext>
-    </p:extLst>
-  </p:cSld>
-  <p:clrMapOvr>
-    <a:masterClrMapping/>
-  </p:clrMapOvr>
-</p:sld>
-</file>
-
-<file path=ppt/slides/slide26.xml><?xml version="1.0" encoding="utf-8"?>
-<p:sld xmlns:a="http://schemas.openxmlformats.org/drawingml/2006/main" xmlns:r="http://schemas.openxmlformats.org/officeDocument/2006/relationships" xmlns:p="http://schemas.openxmlformats.org/presentationml/2006/main">
-  <p:cSld>
-    <p:spTree>
-      <p:nvGrpSpPr>
-        <p:cNvPr id="1" name=""/>
-        <p:cNvGrpSpPr/>
-        <p:nvPr/>
-      </p:nvGrpSpPr>
-      <p:grpSpPr>
-        <a:xfrm>
-          <a:off x="0" y="0"/>
-          <a:ext cx="0" cy="0"/>
-          <a:chOff x="0" y="0"/>
-          <a:chExt cx="0" cy="0"/>
-        </a:xfrm>
-      </p:grpSpPr>
-      <p:sp>
-        <p:nvSpPr>
-          <p:cNvPr id="2" name="Title 1">
-            <a:extLst>
-              <a:ext uri="{FF2B5EF4-FFF2-40B4-BE49-F238E27FC236}">
-                <a16:creationId xmlns:a16="http://schemas.microsoft.com/office/drawing/2014/main" id="{EE164712-622E-E97B-3683-7DCE67B69C84}"/>
-              </a:ext>
-            </a:extLst>
-          </p:cNvPr>
-          <p:cNvSpPr>
-            <a:spLocks noGrp="1"/>
-          </p:cNvSpPr>
-          <p:nvPr>
-            <p:ph type="title"/>
-          </p:nvPr>
-        </p:nvSpPr>
-        <p:spPr/>
-        <p:txBody>
-          <a:bodyPr/>
-          <a:lstStyle/>
-          <a:p>
-            <a:endParaRPr lang="en-EG"/>
-          </a:p>
-        </p:txBody>
-      </p:sp>
-      <p:sp>
-        <p:nvSpPr>
-          <p:cNvPr id="3" name="Content Placeholder 2">
-            <a:extLst>
-              <a:ext uri="{FF2B5EF4-FFF2-40B4-BE49-F238E27FC236}">
-                <a16:creationId xmlns:a16="http://schemas.microsoft.com/office/drawing/2014/main" id="{EC51ACE5-93E3-0BA4-EA83-55835C36A96D}"/>
-              </a:ext>
-            </a:extLst>
-          </p:cNvPr>
-          <p:cNvSpPr>
-            <a:spLocks noGrp="1"/>
-          </p:cNvSpPr>
-          <p:nvPr>
-            <p:ph idx="1"/>
-          </p:nvPr>
-        </p:nvSpPr>
-        <p:spPr/>
-        <p:txBody>
-          <a:bodyPr/>
-          <a:lstStyle/>
-          <a:p>
-            <a:endParaRPr lang="en-EG"/>
-          </a:p>
-        </p:txBody>
-      </p:sp>
-    </p:spTree>
-    <p:extLst>
-      <p:ext uri="{BB962C8B-B14F-4D97-AF65-F5344CB8AC3E}">
-        <p14:creationId xmlns:p14="http://schemas.microsoft.com/office/powerpoint/2010/main" val="2724110773"/>
-      </p:ext>
-    </p:extLst>
-  </p:cSld>
-  <p:clrMapOvr>
-    <a:masterClrMapping/>
-  </p:clrMapOvr>
-</p:sld>
-</file>
-
-<file path=ppt/slides/slide27.xml><?xml version="1.0" encoding="utf-8"?>
-<p:sld xmlns:a="http://schemas.openxmlformats.org/drawingml/2006/main" xmlns:r="http://schemas.openxmlformats.org/officeDocument/2006/relationships" xmlns:p="http://schemas.openxmlformats.org/presentationml/2006/main">
-  <p:cSld>
-    <p:spTree>
-      <p:nvGrpSpPr>
-        <p:cNvPr id="1" name=""/>
-        <p:cNvGrpSpPr/>
-        <p:nvPr/>
-      </p:nvGrpSpPr>
-      <p:grpSpPr>
-        <a:xfrm>
-          <a:off x="0" y="0"/>
-          <a:ext cx="0" cy="0"/>
-          <a:chOff x="0" y="0"/>
-          <a:chExt cx="0" cy="0"/>
-        </a:xfrm>
-      </p:grpSpPr>
-      <p:sp>
-        <p:nvSpPr>
-          <p:cNvPr id="2" name="Title 1">
-            <a:extLst>
-              <a:ext uri="{FF2B5EF4-FFF2-40B4-BE49-F238E27FC236}">
-                <a16:creationId xmlns:a16="http://schemas.microsoft.com/office/drawing/2014/main" id="{7A961402-4074-1FA3-F68D-48CB75550C16}"/>
-              </a:ext>
-            </a:extLst>
-          </p:cNvPr>
-          <p:cNvSpPr>
-            <a:spLocks noGrp="1"/>
-          </p:cNvSpPr>
-          <p:nvPr>
-            <p:ph type="title"/>
-          </p:nvPr>
-        </p:nvSpPr>
-        <p:spPr/>
-        <p:txBody>
-          <a:bodyPr/>
-          <a:lstStyle/>
-          <a:p>
-            <a:endParaRPr lang="en-EG"/>
-          </a:p>
-        </p:txBody>
-      </p:sp>
-      <p:sp>
-        <p:nvSpPr>
-          <p:cNvPr id="3" name="Content Placeholder 2">
-            <a:extLst>
-              <a:ext uri="{FF2B5EF4-FFF2-40B4-BE49-F238E27FC236}">
-                <a16:creationId xmlns:a16="http://schemas.microsoft.com/office/drawing/2014/main" id="{931C6C64-152D-1308-D0BE-D5BDFC208A6F}"/>
-              </a:ext>
-            </a:extLst>
-          </p:cNvPr>
-          <p:cNvSpPr>
-            <a:spLocks noGrp="1"/>
-          </p:cNvSpPr>
-          <p:nvPr>
-            <p:ph idx="1"/>
-          </p:nvPr>
-        </p:nvSpPr>
-        <p:spPr/>
-        <p:txBody>
-          <a:bodyPr/>
-          <a:lstStyle/>
-          <a:p>
-            <a:endParaRPr lang="en-EG"/>
-          </a:p>
-        </p:txBody>
-      </p:sp>
-    </p:spTree>
-    <p:extLst>
-      <p:ext uri="{BB962C8B-B14F-4D97-AF65-F5344CB8AC3E}">
-        <p14:creationId xmlns:p14="http://schemas.microsoft.com/office/powerpoint/2010/main" val="1755619946"/>
-      </p:ext>
-    </p:extLst>
-  </p:cSld>
-  <p:clrMapOvr>
-    <a:masterClrMapping/>
-  </p:clrMapOvr>
-</p:sld>
-</file>
-
-<file path=ppt/slides/slide28.xml><?xml version="1.0" encoding="utf-8"?>
-<p:sld xmlns:a="http://schemas.openxmlformats.org/drawingml/2006/main" xmlns:r="http://schemas.openxmlformats.org/officeDocument/2006/relationships" xmlns:p="http://schemas.openxmlformats.org/presentationml/2006/main">
-  <p:cSld>
-    <p:spTree>
-      <p:nvGrpSpPr>
-        <p:cNvPr id="1" name=""/>
-        <p:cNvGrpSpPr/>
-        <p:nvPr/>
-      </p:nvGrpSpPr>
-      <p:grpSpPr>
-        <a:xfrm>
-          <a:off x="0" y="0"/>
-          <a:ext cx="0" cy="0"/>
-          <a:chOff x="0" y="0"/>
-          <a:chExt cx="0" cy="0"/>
-        </a:xfrm>
-      </p:grpSpPr>
-      <p:sp>
-        <p:nvSpPr>
-          <p:cNvPr id="2" name="Title 1">
-            <a:extLst>
-              <a:ext uri="{FF2B5EF4-FFF2-40B4-BE49-F238E27FC236}">
-                <a16:creationId xmlns:a16="http://schemas.microsoft.com/office/drawing/2014/main" id="{1C582725-D485-A1BE-4716-98FF680BD41B}"/>
-              </a:ext>
-            </a:extLst>
-          </p:cNvPr>
-          <p:cNvSpPr>
-            <a:spLocks noGrp="1"/>
-          </p:cNvSpPr>
-          <p:nvPr>
-            <p:ph type="title"/>
-          </p:nvPr>
-        </p:nvSpPr>
-        <p:spPr/>
-        <p:txBody>
-          <a:bodyPr/>
-          <a:lstStyle/>
-          <a:p>
-            <a:endParaRPr lang="en-EG"/>
-          </a:p>
-        </p:txBody>
-      </p:sp>
-      <p:sp>
-        <p:nvSpPr>
-          <p:cNvPr id="3" name="Content Placeholder 2">
-            <a:extLst>
-              <a:ext uri="{FF2B5EF4-FFF2-40B4-BE49-F238E27FC236}">
-                <a16:creationId xmlns:a16="http://schemas.microsoft.com/office/drawing/2014/main" id="{A9594944-8D02-0A11-68D6-42FF8E1F18BE}"/>
-              </a:ext>
-            </a:extLst>
-          </p:cNvPr>
-          <p:cNvSpPr>
-            <a:spLocks noGrp="1"/>
-          </p:cNvSpPr>
-          <p:nvPr>
-            <p:ph idx="1"/>
-          </p:nvPr>
-        </p:nvSpPr>
-        <p:spPr/>
-        <p:txBody>
-          <a:bodyPr/>
-          <a:lstStyle/>
-          <a:p>
-            <a:endParaRPr lang="en-EG"/>
-          </a:p>
-        </p:txBody>
-      </p:sp>
-    </p:spTree>
-    <p:extLst>
-      <p:ext uri="{BB962C8B-B14F-4D97-AF65-F5344CB8AC3E}">
-        <p14:creationId xmlns:p14="http://schemas.microsoft.com/office/powerpoint/2010/main" val="672948727"/>
-      </p:ext>
-    </p:extLst>
-  </p:cSld>
-  <p:clrMapOvr>
-    <a:masterClrMapping/>
-  </p:clrMapOvr>
-</p:sld>
-</file>
-
-<file path=ppt/slides/slide29.xml><?xml version="1.0" encoding="utf-8"?>
-<p:sld xmlns:a="http://schemas.openxmlformats.org/drawingml/2006/main" xmlns:r="http://schemas.openxmlformats.org/officeDocument/2006/relationships" xmlns:p="http://schemas.openxmlformats.org/presentationml/2006/main">
-  <p:cSld>
-    <p:spTree>
-      <p:nvGrpSpPr>
-        <p:cNvPr id="1" name=""/>
-        <p:cNvGrpSpPr/>
-        <p:nvPr/>
-      </p:nvGrpSpPr>
-      <p:grpSpPr>
-        <a:xfrm>
-          <a:off x="0" y="0"/>
-          <a:ext cx="0" cy="0"/>
-          <a:chOff x="0" y="0"/>
-          <a:chExt cx="0" cy="0"/>
-        </a:xfrm>
-      </p:grpSpPr>
-      <p:sp>
-        <p:nvSpPr>
-          <p:cNvPr id="2" name="Title 1">
-            <a:extLst>
-              <a:ext uri="{FF2B5EF4-FFF2-40B4-BE49-F238E27FC236}">
-                <a16:creationId xmlns:a16="http://schemas.microsoft.com/office/drawing/2014/main" id="{55E8C589-D0DD-F5FB-4CFD-A2571D02FF40}"/>
-              </a:ext>
-            </a:extLst>
-          </p:cNvPr>
-          <p:cNvSpPr>
-            <a:spLocks noGrp="1"/>
-          </p:cNvSpPr>
-          <p:nvPr>
-            <p:ph type="title"/>
-          </p:nvPr>
-        </p:nvSpPr>
-        <p:spPr/>
-        <p:txBody>
-          <a:bodyPr/>
-          <a:lstStyle/>
-          <a:p>
-            <a:r>
-              <a:rPr lang="en-US" dirty="0"/>
-              <a:t>C</a:t>
-            </a:r>
-            <a:r>
-              <a:rPr lang="en-EG" dirty="0"/>
-              <a:t>onclusion </a:t>
-            </a:r>
-          </a:p>
-        </p:txBody>
-      </p:sp>
-      <p:sp>
-        <p:nvSpPr>
-          <p:cNvPr id="3" name="Content Placeholder 2">
-            <a:extLst>
-              <a:ext uri="{FF2B5EF4-FFF2-40B4-BE49-F238E27FC236}">
-                <a16:creationId xmlns:a16="http://schemas.microsoft.com/office/drawing/2014/main" id="{BA27E17E-F0CA-828E-2C1F-D4E080C62306}"/>
-              </a:ext>
-            </a:extLst>
-          </p:cNvPr>
-          <p:cNvSpPr>
-            <a:spLocks noGrp="1"/>
-          </p:cNvSpPr>
-          <p:nvPr>
-            <p:ph idx="1"/>
-          </p:nvPr>
-        </p:nvSpPr>
-        <p:spPr/>
-        <p:txBody>
-          <a:bodyPr/>
-          <a:lstStyle/>
-          <a:p>
-            <a:r>
-              <a:rPr lang="en-US" dirty="0"/>
-              <a:t>W</a:t>
-            </a:r>
-            <a:r>
-              <a:rPr lang="en-EG" dirty="0"/>
-              <a:t>e have sen that users are using our services. We need to continue investigate more our dataset then perfom </a:t>
-            </a:r>
-            <a:r>
-              <a:rPr lang="en-US" dirty="0"/>
-              <a:t>User Engagement analysis</a:t>
-            </a:r>
-            <a:r>
-              <a:rPr lang="en-EG" dirty="0"/>
-              <a:t>.</a:t>
-            </a:r>
-          </a:p>
-          <a:p>
-            <a:r>
-              <a:rPr lang="en-US" dirty="0"/>
-              <a:t>N</a:t>
-            </a:r>
-            <a:r>
-              <a:rPr lang="en-EG" dirty="0"/>
-              <a:t>ext activity:</a:t>
-            </a:r>
-          </a:p>
-          <a:p>
-            <a:pPr lvl="1"/>
-            <a:r>
-              <a:rPr lang="en-US" dirty="0"/>
-              <a:t>User Engagement analysis</a:t>
-            </a:r>
-            <a:endParaRPr lang="en-EG" dirty="0"/>
-          </a:p>
-          <a:p>
-            <a:pPr lvl="1"/>
-            <a:endParaRPr lang="en-EG" dirty="0"/>
-          </a:p>
-        </p:txBody>
-      </p:sp>
-    </p:spTree>
-    <p:extLst>
-      <p:ext uri="{BB962C8B-B14F-4D97-AF65-F5344CB8AC3E}">
-        <p14:creationId xmlns:p14="http://schemas.microsoft.com/office/powerpoint/2010/main" val="2145198974"/>
+        <p14:creationId xmlns:p14="http://schemas.microsoft.com/office/powerpoint/2010/main" val="3699771128"/>
       </p:ext>
     </p:extLst>
   </p:cSld>
@@ -8523,93 +7952,6 @@
     <p:extLst>
       <p:ext uri="{BB962C8B-B14F-4D97-AF65-F5344CB8AC3E}">
         <p14:creationId xmlns:p14="http://schemas.microsoft.com/office/powerpoint/2010/main" val="3889527238"/>
-      </p:ext>
-    </p:extLst>
-  </p:cSld>
-  <p:clrMapOvr>
-    <a:masterClrMapping/>
-  </p:clrMapOvr>
-</p:sld>
-</file>
-
-<file path=ppt/slides/slide30.xml><?xml version="1.0" encoding="utf-8"?>
-<p:sld xmlns:a="http://schemas.openxmlformats.org/drawingml/2006/main" xmlns:r="http://schemas.openxmlformats.org/officeDocument/2006/relationships" xmlns:p="http://schemas.openxmlformats.org/presentationml/2006/main">
-  <p:cSld>
-    <p:spTree>
-      <p:nvGrpSpPr>
-        <p:cNvPr id="1" name=""/>
-        <p:cNvGrpSpPr/>
-        <p:nvPr/>
-      </p:nvGrpSpPr>
-      <p:grpSpPr>
-        <a:xfrm>
-          <a:off x="0" y="0"/>
-          <a:ext cx="0" cy="0"/>
-          <a:chOff x="0" y="0"/>
-          <a:chExt cx="0" cy="0"/>
-        </a:xfrm>
-      </p:grpSpPr>
-      <p:sp>
-        <p:nvSpPr>
-          <p:cNvPr id="2" name="Title 1">
-            <a:extLst>
-              <a:ext uri="{FF2B5EF4-FFF2-40B4-BE49-F238E27FC236}">
-                <a16:creationId xmlns:a16="http://schemas.microsoft.com/office/drawing/2014/main" id="{930DAD1A-FF01-7641-A0CC-0A8CB6AF9516}"/>
-              </a:ext>
-            </a:extLst>
-          </p:cNvPr>
-          <p:cNvSpPr>
-            <a:spLocks noGrp="1"/>
-          </p:cNvSpPr>
-          <p:nvPr>
-            <p:ph type="title"/>
-          </p:nvPr>
-        </p:nvSpPr>
-        <p:spPr/>
-        <p:txBody>
-          <a:bodyPr/>
-          <a:lstStyle/>
-          <a:p>
-            <a:r>
-              <a:rPr lang="en-US" dirty="0"/>
-              <a:t>END</a:t>
-            </a:r>
-          </a:p>
-        </p:txBody>
-      </p:sp>
-      <p:pic>
-        <p:nvPicPr>
-          <p:cNvPr id="5" name="Content Placeholder 4">
-            <a:extLst>
-              <a:ext uri="{FF2B5EF4-FFF2-40B4-BE49-F238E27FC236}">
-                <a16:creationId xmlns:a16="http://schemas.microsoft.com/office/drawing/2014/main" id="{7142BD6D-643A-AA7B-4FA1-2187A8A5B325}"/>
-              </a:ext>
-            </a:extLst>
-          </p:cNvPr>
-          <p:cNvPicPr>
-            <a:picLocks noGrp="1" noChangeAspect="1"/>
-          </p:cNvPicPr>
-          <p:nvPr>
-            <p:ph idx="1"/>
-          </p:nvPr>
-        </p:nvPicPr>
-        <p:blipFill>
-          <a:blip r:embed="rId2"/>
-          <a:stretch>
-            <a:fillRect/>
-          </a:stretch>
-        </p:blipFill>
-        <p:spPr>
-          <a:xfrm>
-            <a:off x="3606038" y="2557463"/>
-            <a:ext cx="4979924" cy="3317875"/>
-          </a:xfrm>
-        </p:spPr>
-      </p:pic>
-    </p:spTree>
-    <p:extLst>
-      <p:ext uri="{BB962C8B-B14F-4D97-AF65-F5344CB8AC3E}">
-        <p14:creationId xmlns:p14="http://schemas.microsoft.com/office/powerpoint/2010/main" val="3699771128"/>
       </p:ext>
     </p:extLst>
   </p:cSld>

</xml_diff>